<commit_message>
edit final data lecture
</commit_message>
<xml_diff>
--- a/maryland-lecture.pptx
+++ b/maryland-lecture.pptx
@@ -15162,13 +15162,7 @@
               <a:rPr lang="en-US" dirty="0" smtClean="0"/>
               <a:t>Projects</a:t>
             </a:r>
-          </a:p>
-          <a:p>
-            <a:r>
-              <a:rPr lang="en-US" dirty="0" smtClean="0"/>
-              <a:t>Skills I Use</a:t>
-            </a:r>
-            <a:endParaRPr lang="en-US" dirty="0"/>
+            <a:endParaRPr lang="en-US" dirty="0" smtClean="0"/>
           </a:p>
         </p:txBody>
       </p:sp>
@@ -15858,7 +15852,12 @@
             <p:ph type="title"/>
           </p:nvPr>
         </p:nvSpPr>
-        <p:spPr/>
+        <p:spPr>
+          <a:xfrm>
+            <a:off x="1066800" y="381000"/>
+            <a:ext cx="7024744" cy="1143000"/>
+          </a:xfrm>
+        </p:spPr>
         <p:txBody>
           <a:bodyPr/>
           <a:lstStyle/>
@@ -15955,6 +15954,21 @@
             <a:off x="228600" y="1676400"/>
             <a:ext cx="3429000" cy="3632415"/>
           </a:xfrm>
+          <a:prstGeom prst="rect">
+            <a:avLst/>
+          </a:prstGeom>
+          <a:ln w="88900" cap="sq" cmpd="thickThin">
+            <a:solidFill>
+              <a:srgbClr val="000000"/>
+            </a:solidFill>
+            <a:prstDash val="solid"/>
+            <a:miter lim="800000"/>
+          </a:ln>
+          <a:effectLst>
+            <a:innerShdw blurRad="76200">
+              <a:srgbClr val="000000"/>
+            </a:innerShdw>
+          </a:effectLst>
         </p:spPr>
       </p:pic>
     </p:spTree>
@@ -16092,6 +16106,21 @@
             <a:off x="4876800" y="1295400"/>
             <a:ext cx="3505200" cy="5037413"/>
           </a:xfrm>
+          <a:prstGeom prst="rect">
+            <a:avLst/>
+          </a:prstGeom>
+          <a:ln w="88900" cap="sq" cmpd="thickThin">
+            <a:solidFill>
+              <a:srgbClr val="000000"/>
+            </a:solidFill>
+            <a:prstDash val="solid"/>
+            <a:miter lim="800000"/>
+          </a:ln>
+          <a:effectLst>
+            <a:innerShdw blurRad="76200">
+              <a:srgbClr val="000000"/>
+            </a:innerShdw>
+          </a:effectLst>
         </p:spPr>
       </p:pic>
     </p:spTree>
@@ -16380,6 +16409,18 @@
           <a:prstGeom prst="rect">
             <a:avLst/>
           </a:prstGeom>
+          <a:ln w="88900" cap="sq" cmpd="thickThin">
+            <a:solidFill>
+              <a:srgbClr val="000000"/>
+            </a:solidFill>
+            <a:prstDash val="solid"/>
+            <a:miter lim="800000"/>
+          </a:ln>
+          <a:effectLst>
+            <a:innerShdw blurRad="76200">
+              <a:srgbClr val="000000"/>
+            </a:innerShdw>
+          </a:effectLst>
         </p:spPr>
       </p:pic>
     </p:spTree>
@@ -16514,6 +16555,21 @@
             <a:off x="4493746" y="2057400"/>
             <a:ext cx="4123765" cy="3505200"/>
           </a:xfrm>
+          <a:prstGeom prst="rect">
+            <a:avLst/>
+          </a:prstGeom>
+          <a:ln w="88900" cap="sq" cmpd="thickThin">
+            <a:solidFill>
+              <a:srgbClr val="000000"/>
+            </a:solidFill>
+            <a:prstDash val="solid"/>
+            <a:miter lim="800000"/>
+          </a:ln>
+          <a:effectLst>
+            <a:innerShdw blurRad="76200">
+              <a:srgbClr val="000000"/>
+            </a:innerShdw>
+          </a:effectLst>
         </p:spPr>
       </p:pic>
       <p:sp>
@@ -19186,7 +19242,12 @@
             <p:ph type="title"/>
           </p:nvPr>
         </p:nvSpPr>
-        <p:spPr/>
+        <p:spPr>
+          <a:xfrm>
+            <a:off x="1066800" y="457200"/>
+            <a:ext cx="7024744" cy="1143000"/>
+          </a:xfrm>
+        </p:spPr>
         <p:txBody>
           <a:bodyPr/>
           <a:lstStyle/>

</xml_diff>